<commit_message>
Updated with MS stuff
Improvement
</commit_message>
<xml_diff>
--- a/Teaching/Milestone/Uncertainty/UncertaintyShoppingLecture.pptx
+++ b/Teaching/Milestone/Uncertainty/UncertaintyShoppingLecture.pptx
@@ -409,7 +409,7 @@
           <a:effectLst/>
           <a:extLst>
             <a:ext uri="{91240B29-F687-4f45-9708-019B960494DF}">
-              <a14:hiddenLine xmlns:a14="http://schemas.microsoft.com/office/drawing/2010/main" xmlns="" w="9525">
+              <a14:hiddenLine xmlns="" xmlns:a14="http://schemas.microsoft.com/office/drawing/2010/main" w="9525">
                 <a:solidFill>
                   <a:srgbClr val="000000"/>
                 </a:solidFill>
@@ -1931,7 +1931,7 @@
           <a:ln/>
           <a:extLst>
             <a:ext uri="{91240B29-F687-4f45-9708-019B960494DF}">
-              <a14:hiddenLine xmlns:a14="http://schemas.microsoft.com/office/drawing/2010/main" xmlns="" w="9525">
+              <a14:hiddenLine xmlns="" xmlns:a14="http://schemas.microsoft.com/office/drawing/2010/main" w="9525">
                 <a:solidFill>
                   <a:srgbClr val="000000"/>
                 </a:solidFill>
@@ -2206,7 +2206,7 @@
           <a:ln/>
           <a:extLst>
             <a:ext uri="{91240B29-F687-4f45-9708-019B960494DF}">
-              <a14:hiddenLine xmlns:a14="http://schemas.microsoft.com/office/drawing/2010/main" xmlns="" w="9525">
+              <a14:hiddenLine xmlns="" xmlns:a14="http://schemas.microsoft.com/office/drawing/2010/main" w="9525">
                 <a:solidFill>
                   <a:srgbClr val="000000"/>
                 </a:solidFill>
@@ -2489,7 +2489,7 @@
           <a:ln/>
           <a:extLst>
             <a:ext uri="{91240B29-F687-4f45-9708-019B960494DF}">
-              <a14:hiddenLine xmlns:a14="http://schemas.microsoft.com/office/drawing/2010/main" xmlns="" w="9525">
+              <a14:hiddenLine xmlns="" xmlns:a14="http://schemas.microsoft.com/office/drawing/2010/main" w="9525">
                 <a:solidFill>
                   <a:srgbClr val="000000"/>
                 </a:solidFill>
@@ -3303,7 +3303,7 @@
           <a:ln/>
           <a:extLst>
             <a:ext uri="{91240B29-F687-4f45-9708-019B960494DF}">
-              <a14:hiddenLine xmlns:a14="http://schemas.microsoft.com/office/drawing/2010/main" xmlns="" w="9525">
+              <a14:hiddenLine xmlns="" xmlns:a14="http://schemas.microsoft.com/office/drawing/2010/main" w="9525">
                 <a:solidFill>
                   <a:srgbClr val="000000"/>
                 </a:solidFill>
@@ -3470,7 +3470,7 @@
           <a:ln/>
           <a:extLst>
             <a:ext uri="{91240B29-F687-4f45-9708-019B960494DF}">
-              <a14:hiddenLine xmlns:a14="http://schemas.microsoft.com/office/drawing/2010/main" xmlns="" w="9525">
+              <a14:hiddenLine xmlns="" xmlns:a14="http://schemas.microsoft.com/office/drawing/2010/main" w="9525">
                 <a:solidFill>
                   <a:srgbClr val="000000"/>
                 </a:solidFill>
@@ -3947,7 +3947,7 @@
           <a:ln/>
           <a:extLst>
             <a:ext uri="{91240B29-F687-4f45-9708-019B960494DF}">
-              <a14:hiddenLine xmlns:a14="http://schemas.microsoft.com/office/drawing/2010/main" xmlns="" w="9525">
+              <a14:hiddenLine xmlns="" xmlns:a14="http://schemas.microsoft.com/office/drawing/2010/main" w="9525">
                 <a:solidFill>
                   <a:srgbClr val="000000"/>
                 </a:solidFill>
@@ -4376,7 +4376,7 @@
           <a:ln/>
           <a:extLst>
             <a:ext uri="{91240B29-F687-4f45-9708-019B960494DF}">
-              <a14:hiddenLine xmlns:a14="http://schemas.microsoft.com/office/drawing/2010/main" xmlns="" w="9525">
+              <a14:hiddenLine xmlns="" xmlns:a14="http://schemas.microsoft.com/office/drawing/2010/main" w="9525">
                 <a:solidFill>
                   <a:srgbClr val="000000"/>
                 </a:solidFill>
@@ -6227,11 +6227,17 @@
           <a:p>
             <a:r>
               <a:rPr lang="en-US" dirty="0"/>
-              <a:t>Computer science: How can computers make decisions using the </a:t>
+              <a:t>Computer science: How can computers make decisions using the same framework?</a:t>
+            </a:r>
+          </a:p>
+          <a:p>
+            <a:r>
+              <a:rPr lang="en-US" dirty="0"/>
+              <a:t>Humanities: General understanding of how we </a:t>
             </a:r>
             <a:r>
               <a:rPr lang="en-US"/>
-              <a:t>same framework?</a:t>
+              <a:t>model decision making</a:t>
             </a:r>
             <a:endParaRPr lang="en-US" dirty="0"/>
           </a:p>

</xml_diff>